<commit_message>
added sample plotting scripts
</commit_message>
<xml_diff>
--- a/slides/20200611_longterm_planning.pptx
+++ b/slides/20200611_longterm_planning.pptx
@@ -266,7 +266,7 @@
           <a:p>
             <a:fld id="{16FE01BA-90EA-C542-984B-FCBCBC39AD3F}" type="datetimeFigureOut">
               <a:rPr lang="en-US" smtClean="0"/>
-              <a:t>6/11/20</a:t>
+              <a:t>6/12/20</a:t>
             </a:fld>
             <a:endParaRPr lang="en-US"/>
           </a:p>
@@ -464,7 +464,7 @@
           <a:p>
             <a:fld id="{16FE01BA-90EA-C542-984B-FCBCBC39AD3F}" type="datetimeFigureOut">
               <a:rPr lang="en-US" smtClean="0"/>
-              <a:t>6/11/20</a:t>
+              <a:t>6/12/20</a:t>
             </a:fld>
             <a:endParaRPr lang="en-US"/>
           </a:p>
@@ -672,7 +672,7 @@
           <a:p>
             <a:fld id="{16FE01BA-90EA-C542-984B-FCBCBC39AD3F}" type="datetimeFigureOut">
               <a:rPr lang="en-US" smtClean="0"/>
-              <a:t>6/11/20</a:t>
+              <a:t>6/12/20</a:t>
             </a:fld>
             <a:endParaRPr lang="en-US"/>
           </a:p>
@@ -870,7 +870,7 @@
           <a:p>
             <a:fld id="{16FE01BA-90EA-C542-984B-FCBCBC39AD3F}" type="datetimeFigureOut">
               <a:rPr lang="en-US" smtClean="0"/>
-              <a:t>6/11/20</a:t>
+              <a:t>6/12/20</a:t>
             </a:fld>
             <a:endParaRPr lang="en-US"/>
           </a:p>
@@ -1145,7 +1145,7 @@
           <a:p>
             <a:fld id="{16FE01BA-90EA-C542-984B-FCBCBC39AD3F}" type="datetimeFigureOut">
               <a:rPr lang="en-US" smtClean="0"/>
-              <a:t>6/11/20</a:t>
+              <a:t>6/12/20</a:t>
             </a:fld>
             <a:endParaRPr lang="en-US"/>
           </a:p>
@@ -1410,7 +1410,7 @@
           <a:p>
             <a:fld id="{16FE01BA-90EA-C542-984B-FCBCBC39AD3F}" type="datetimeFigureOut">
               <a:rPr lang="en-US" smtClean="0"/>
-              <a:t>6/11/20</a:t>
+              <a:t>6/12/20</a:t>
             </a:fld>
             <a:endParaRPr lang="en-US"/>
           </a:p>
@@ -1822,7 +1822,7 @@
           <a:p>
             <a:fld id="{16FE01BA-90EA-C542-984B-FCBCBC39AD3F}" type="datetimeFigureOut">
               <a:rPr lang="en-US" smtClean="0"/>
-              <a:t>6/11/20</a:t>
+              <a:t>6/12/20</a:t>
             </a:fld>
             <a:endParaRPr lang="en-US"/>
           </a:p>
@@ -1963,7 +1963,7 @@
           <a:p>
             <a:fld id="{16FE01BA-90EA-C542-984B-FCBCBC39AD3F}" type="datetimeFigureOut">
               <a:rPr lang="en-US" smtClean="0"/>
-              <a:t>6/11/20</a:t>
+              <a:t>6/12/20</a:t>
             </a:fld>
             <a:endParaRPr lang="en-US"/>
           </a:p>
@@ -2076,7 +2076,7 @@
           <a:p>
             <a:fld id="{16FE01BA-90EA-C542-984B-FCBCBC39AD3F}" type="datetimeFigureOut">
               <a:rPr lang="en-US" smtClean="0"/>
-              <a:t>6/11/20</a:t>
+              <a:t>6/12/20</a:t>
             </a:fld>
             <a:endParaRPr lang="en-US"/>
           </a:p>
@@ -2387,7 +2387,7 @@
           <a:p>
             <a:fld id="{16FE01BA-90EA-C542-984B-FCBCBC39AD3F}" type="datetimeFigureOut">
               <a:rPr lang="en-US" smtClean="0"/>
-              <a:t>6/11/20</a:t>
+              <a:t>6/12/20</a:t>
             </a:fld>
             <a:endParaRPr lang="en-US"/>
           </a:p>
@@ -2675,7 +2675,7 @@
           <a:p>
             <a:fld id="{16FE01BA-90EA-C542-984B-FCBCBC39AD3F}" type="datetimeFigureOut">
               <a:rPr lang="en-US" smtClean="0"/>
-              <a:t>6/11/20</a:t>
+              <a:t>6/12/20</a:t>
             </a:fld>
             <a:endParaRPr lang="en-US"/>
           </a:p>
@@ -2916,7 +2916,7 @@
           <a:p>
             <a:fld id="{16FE01BA-90EA-C542-984B-FCBCBC39AD3F}" type="datetimeFigureOut">
               <a:rPr lang="en-US" smtClean="0"/>
-              <a:t>6/11/20</a:t>
+              <a:t>6/12/20</a:t>
             </a:fld>
             <a:endParaRPr lang="en-US"/>
           </a:p>
@@ -3482,10 +3482,13 @@
           <a:p>
             <a:r>
               <a:rPr lang="en-US" dirty="0"/>
-              <a:t>June 14 – 19: PUFA week, phylogenetics, and genome neighborhoods</a:t>
-            </a:r>
-          </a:p>
-          <a:p>
+              <a:t>June 14 – 19: PUFA week! </a:t>
+            </a:r>
+          </a:p>
+          <a:p>
+            <a:pPr marL="0" indent="0">
+              <a:buNone/>
+            </a:pPr>
             <a:endParaRPr lang="en-US" dirty="0"/>
           </a:p>
           <a:p>
@@ -4574,7 +4577,7 @@
         </p:spPr>
         <p:txBody>
           <a:bodyPr>
-            <a:normAutofit/>
+            <a:normAutofit lnSpcReduction="10000"/>
           </a:bodyPr>
           <a:lstStyle/>
           <a:p>
@@ -4589,6 +4592,15 @@
           <a:p>
             <a:r>
               <a:rPr lang="en-US" dirty="0"/>
+              <a:t>Building simple web applications</a:t>
+            </a:r>
+          </a:p>
+          <a:p>
+            <a:endParaRPr lang="en-US" dirty="0"/>
+          </a:p>
+          <a:p>
+            <a:r>
+              <a:rPr lang="en-US" dirty="0"/>
               <a:t>Mapping</a:t>
             </a:r>
           </a:p>
@@ -4601,7 +4613,7 @@
           <a:p>
             <a:r>
               <a:rPr lang="en-US" dirty="0"/>
-              <a:t>Phylogenetics</a:t>
+              <a:t>Genome analysis</a:t>
             </a:r>
           </a:p>
           <a:p>
@@ -4613,18 +4625,6 @@
           <a:p>
             <a:r>
               <a:rPr lang="en-US" dirty="0"/>
-              <a:t>Genome analysis</a:t>
-            </a:r>
-          </a:p>
-          <a:p>
-            <a:pPr marL="0" indent="0">
-              <a:buNone/>
-            </a:pPr>
-            <a:endParaRPr lang="en-US" dirty="0"/>
-          </a:p>
-          <a:p>
-            <a:r>
-              <a:rPr lang="en-US" dirty="0"/>
               <a:t>Protein structure analysis</a:t>
             </a:r>
           </a:p>
@@ -4650,8 +4650,8 @@
         </p:nvSpPr>
         <p:spPr>
           <a:xfrm>
-            <a:off x="5638800" y="1749392"/>
-            <a:ext cx="6096000" cy="4401205"/>
+            <a:off x="5740400" y="1342992"/>
+            <a:ext cx="6096000" cy="5262979"/>
           </a:xfrm>
           <a:prstGeom prst="rect">
             <a:avLst/>
@@ -4667,6 +4667,23 @@
               <a:rPr lang="en-US" sz="2800" b="1" dirty="0"/>
               <a:t>Optional:</a:t>
             </a:r>
+          </a:p>
+          <a:p>
+            <a:pPr marL="457200" indent="-457200">
+              <a:buFont typeface="Arial" panose="020B0604020202020204" pitchFamily="34" charset="0"/>
+              <a:buChar char="•"/>
+            </a:pPr>
+            <a:r>
+              <a:rPr lang="en-US" sz="2800" dirty="0"/>
+              <a:t>Phylogenetics</a:t>
+            </a:r>
+          </a:p>
+          <a:p>
+            <a:pPr marL="457200" indent="-457200">
+              <a:buFont typeface="Arial" panose="020B0604020202020204" pitchFamily="34" charset="0"/>
+              <a:buChar char="•"/>
+            </a:pPr>
+            <a:endParaRPr lang="en-US" sz="2800" dirty="0"/>
           </a:p>
           <a:p>
             <a:pPr marL="457200" indent="-457200">

</xml_diff>

<commit_message>
update genome neighborhood plot
</commit_message>
<xml_diff>
--- a/slides/20200611_longterm_planning.pptx
+++ b/slides/20200611_longterm_planning.pptx
@@ -11,8 +11,8 @@
     <p:sldId id="278" r:id="rId5"/>
     <p:sldId id="279" r:id="rId6"/>
     <p:sldId id="280" r:id="rId7"/>
-    <p:sldId id="281" r:id="rId8"/>
-    <p:sldId id="276" r:id="rId9"/>
+    <p:sldId id="276" r:id="rId8"/>
+    <p:sldId id="281" r:id="rId9"/>
   </p:sldIdLst>
   <p:sldSz cx="12192000" cy="6858000"/>
   <p:notesSz cx="6858000" cy="9144000"/>
@@ -3477,7 +3477,9 @@
           </a:xfrm>
         </p:spPr>
         <p:txBody>
-          <a:bodyPr/>
+          <a:bodyPr>
+            <a:normAutofit lnSpcReduction="10000"/>
+          </a:bodyPr>
           <a:lstStyle/>
           <a:p>
             <a:r>
@@ -3509,7 +3511,19 @@
               <a:rPr lang="en-US" dirty="0">
                 <a:sym typeface="Wingdings" pitchFamily="2" charset="2"/>
               </a:rPr>
-              <a:t> we can start thinking about some more independent coding projects </a:t>
+              <a:t> we can start thinking about some independent coding projects so you can keep busy! July 3 is a mandatory holiday though </a:t>
+            </a:r>
+            <a:r>
+              <a:rPr lang="en-US" dirty="0" err="1">
+                <a:sym typeface="Wingdings" pitchFamily="2" charset="2"/>
+              </a:rPr>
+              <a:t>hehe</a:t>
+            </a:r>
+            <a:r>
+              <a:rPr lang="en-US" dirty="0">
+                <a:sym typeface="Wingdings" pitchFamily="2" charset="2"/>
+              </a:rPr>
+              <a:t>.</a:t>
             </a:r>
           </a:p>
           <a:p>
@@ -4410,126 +4424,6 @@
           <p:cNvPr id="2" name="Title 1">
             <a:extLst>
               <a:ext uri="{FF2B5EF4-FFF2-40B4-BE49-F238E27FC236}">
-                <a16:creationId xmlns:a16="http://schemas.microsoft.com/office/drawing/2014/main" id="{9170B49B-B38D-A341-BFEA-E37C9DD32DAF}"/>
-              </a:ext>
-            </a:extLst>
-          </p:cNvPr>
-          <p:cNvSpPr>
-            <a:spLocks noGrp="1"/>
-          </p:cNvSpPr>
-          <p:nvPr>
-            <p:ph type="title"/>
-          </p:nvPr>
-        </p:nvSpPr>
-        <p:spPr>
-          <a:xfrm>
-            <a:off x="410183" y="345670"/>
-            <a:ext cx="10515600" cy="1325563"/>
-          </a:xfrm>
-        </p:spPr>
-        <p:txBody>
-          <a:bodyPr/>
-          <a:lstStyle/>
-          <a:p>
-            <a:r>
-              <a:rPr lang="en-US" dirty="0"/>
-              <a:t>Timeline</a:t>
-            </a:r>
-          </a:p>
-        </p:txBody>
-      </p:sp>
-      <p:sp>
-        <p:nvSpPr>
-          <p:cNvPr id="3" name="Content Placeholder 2">
-            <a:extLst>
-              <a:ext uri="{FF2B5EF4-FFF2-40B4-BE49-F238E27FC236}">
-                <a16:creationId xmlns:a16="http://schemas.microsoft.com/office/drawing/2014/main" id="{2584D9A0-E464-9B43-9E4D-E85D04B2EB27}"/>
-              </a:ext>
-            </a:extLst>
-          </p:cNvPr>
-          <p:cNvSpPr>
-            <a:spLocks noGrp="1"/>
-          </p:cNvSpPr>
-          <p:nvPr>
-            <p:ph idx="1"/>
-          </p:nvPr>
-        </p:nvSpPr>
-        <p:spPr/>
-        <p:txBody>
-          <a:bodyPr>
-            <a:normAutofit fontScale="92500" lnSpcReduction="10000"/>
-          </a:bodyPr>
-          <a:lstStyle/>
-          <a:p>
-            <a:r>
-              <a:rPr lang="en-US" sz="3600" dirty="0"/>
-              <a:t>Goal to finish new database version by end of July</a:t>
-            </a:r>
-          </a:p>
-          <a:p>
-            <a:endParaRPr lang="en-US" sz="3600" dirty="0"/>
-          </a:p>
-          <a:p>
-            <a:r>
-              <a:rPr lang="en-US" sz="3600" dirty="0"/>
-              <a:t>Initial meeting with Betsy and group week of June 22</a:t>
-            </a:r>
-          </a:p>
-          <a:p>
-            <a:endParaRPr lang="en-US" sz="3600" dirty="0"/>
-          </a:p>
-          <a:p>
-            <a:r>
-              <a:rPr lang="en-US" sz="3600" dirty="0"/>
-              <a:t>Primary work on project could be done June 27 –&gt; on (especially week of June 27 – July 6)</a:t>
-            </a:r>
-          </a:p>
-          <a:p>
-            <a:endParaRPr lang="en-US" sz="3600" dirty="0"/>
-          </a:p>
-          <a:p>
-            <a:r>
-              <a:rPr lang="en-US" sz="3600" dirty="0"/>
-              <a:t>Check-in meeting with Betsy on July 9</a:t>
-            </a:r>
-          </a:p>
-        </p:txBody>
-      </p:sp>
-    </p:spTree>
-    <p:extLst>
-      <p:ext uri="{BB962C8B-B14F-4D97-AF65-F5344CB8AC3E}">
-        <p14:creationId xmlns:p14="http://schemas.microsoft.com/office/powerpoint/2010/main" val="259484395"/>
-      </p:ext>
-    </p:extLst>
-  </p:cSld>
-  <p:clrMapOvr>
-    <a:masterClrMapping/>
-  </p:clrMapOvr>
-</p:sld>
-</file>
-
-<file path=ppt/slides/slide8.xml><?xml version="1.0" encoding="utf-8"?>
-<p:sld xmlns:a="http://schemas.openxmlformats.org/drawingml/2006/main" xmlns:r="http://schemas.openxmlformats.org/officeDocument/2006/relationships" xmlns:p="http://schemas.openxmlformats.org/presentationml/2006/main">
-  <p:cSld>
-    <p:spTree>
-      <p:nvGrpSpPr>
-        <p:cNvPr id="1" name=""/>
-        <p:cNvGrpSpPr/>
-        <p:nvPr/>
-      </p:nvGrpSpPr>
-      <p:grpSpPr>
-        <a:xfrm>
-          <a:off x="0" y="0"/>
-          <a:ext cx="0" cy="0"/>
-          <a:chOff x="0" y="0"/>
-          <a:chExt cx="0" cy="0"/>
-        </a:xfrm>
-      </p:grpSpPr>
-      <p:sp>
-        <p:nvSpPr>
-          <p:cNvPr id="2" name="Title 1">
-            <a:extLst>
-              <a:ext uri="{FF2B5EF4-FFF2-40B4-BE49-F238E27FC236}">
                 <a16:creationId xmlns:a16="http://schemas.microsoft.com/office/drawing/2014/main" id="{08855CF2-C9CF-9040-95D1-8423D6151F47}"/>
               </a:ext>
             </a:extLst>
@@ -4832,6 +4726,126 @@
       <p:bldP spid="4" grpId="0"/>
     </p:bldLst>
   </p:timing>
+</p:sld>
+</file>
+
+<file path=ppt/slides/slide8.xml><?xml version="1.0" encoding="utf-8"?>
+<p:sld xmlns:a="http://schemas.openxmlformats.org/drawingml/2006/main" xmlns:r="http://schemas.openxmlformats.org/officeDocument/2006/relationships" xmlns:p="http://schemas.openxmlformats.org/presentationml/2006/main">
+  <p:cSld>
+    <p:spTree>
+      <p:nvGrpSpPr>
+        <p:cNvPr id="1" name=""/>
+        <p:cNvGrpSpPr/>
+        <p:nvPr/>
+      </p:nvGrpSpPr>
+      <p:grpSpPr>
+        <a:xfrm>
+          <a:off x="0" y="0"/>
+          <a:ext cx="0" cy="0"/>
+          <a:chOff x="0" y="0"/>
+          <a:chExt cx="0" cy="0"/>
+        </a:xfrm>
+      </p:grpSpPr>
+      <p:sp>
+        <p:nvSpPr>
+          <p:cNvPr id="2" name="Title 1">
+            <a:extLst>
+              <a:ext uri="{FF2B5EF4-FFF2-40B4-BE49-F238E27FC236}">
+                <a16:creationId xmlns:a16="http://schemas.microsoft.com/office/drawing/2014/main" id="{9170B49B-B38D-A341-BFEA-E37C9DD32DAF}"/>
+              </a:ext>
+            </a:extLst>
+          </p:cNvPr>
+          <p:cNvSpPr>
+            <a:spLocks noGrp="1"/>
+          </p:cNvSpPr>
+          <p:nvPr>
+            <p:ph type="title"/>
+          </p:nvPr>
+        </p:nvSpPr>
+        <p:spPr>
+          <a:xfrm>
+            <a:off x="410183" y="345670"/>
+            <a:ext cx="10515600" cy="1325563"/>
+          </a:xfrm>
+        </p:spPr>
+        <p:txBody>
+          <a:bodyPr/>
+          <a:lstStyle/>
+          <a:p>
+            <a:r>
+              <a:rPr lang="en-US" dirty="0"/>
+              <a:t>Timeline</a:t>
+            </a:r>
+          </a:p>
+        </p:txBody>
+      </p:sp>
+      <p:sp>
+        <p:nvSpPr>
+          <p:cNvPr id="3" name="Content Placeholder 2">
+            <a:extLst>
+              <a:ext uri="{FF2B5EF4-FFF2-40B4-BE49-F238E27FC236}">
+                <a16:creationId xmlns:a16="http://schemas.microsoft.com/office/drawing/2014/main" id="{2584D9A0-E464-9B43-9E4D-E85D04B2EB27}"/>
+              </a:ext>
+            </a:extLst>
+          </p:cNvPr>
+          <p:cNvSpPr>
+            <a:spLocks noGrp="1"/>
+          </p:cNvSpPr>
+          <p:nvPr>
+            <p:ph idx="1"/>
+          </p:nvPr>
+        </p:nvSpPr>
+        <p:spPr/>
+        <p:txBody>
+          <a:bodyPr>
+            <a:normAutofit fontScale="92500" lnSpcReduction="10000"/>
+          </a:bodyPr>
+          <a:lstStyle/>
+          <a:p>
+            <a:r>
+              <a:rPr lang="en-US" sz="3600" dirty="0"/>
+              <a:t>Goal to finish new database version by end of July</a:t>
+            </a:r>
+          </a:p>
+          <a:p>
+            <a:endParaRPr lang="en-US" sz="3600" dirty="0"/>
+          </a:p>
+          <a:p>
+            <a:r>
+              <a:rPr lang="en-US" sz="3600" dirty="0"/>
+              <a:t>Initial meeting with Betsy and group week of June 22?</a:t>
+            </a:r>
+          </a:p>
+          <a:p>
+            <a:endParaRPr lang="en-US" sz="3600" dirty="0"/>
+          </a:p>
+          <a:p>
+            <a:r>
+              <a:rPr lang="en-US" sz="3600" dirty="0"/>
+              <a:t>Primary work on project could be done June 27 –&gt; on (especially week of June 27 – July 6)</a:t>
+            </a:r>
+          </a:p>
+          <a:p>
+            <a:endParaRPr lang="en-US" sz="3600" dirty="0"/>
+          </a:p>
+          <a:p>
+            <a:r>
+              <a:rPr lang="en-US" sz="3600" dirty="0"/>
+              <a:t>Check-in meeting with Betsy on July 9</a:t>
+            </a:r>
+          </a:p>
+        </p:txBody>
+      </p:sp>
+    </p:spTree>
+    <p:extLst>
+      <p:ext uri="{BB962C8B-B14F-4D97-AF65-F5344CB8AC3E}">
+        <p14:creationId xmlns:p14="http://schemas.microsoft.com/office/powerpoint/2010/main" val="259484395"/>
+      </p:ext>
+    </p:extLst>
+  </p:cSld>
+  <p:clrMapOvr>
+    <a:masterClrMapping/>
+  </p:clrMapOvr>
 </p:sld>
 </file>
 

</xml_diff>